<commit_message>
new branch for further analysis
</commit_message>
<xml_diff>
--- a/Ironhack.pptx
+++ b/Ironhack.pptx
@@ -537,7 +537,7 @@
               <a:t>inter-comparación</a:t>
             </a:r>
             <a:r>
-              <a:rPr lang="es-ES" b="1" i="0">
+              <a:rPr lang="es-ES" b="1" i="0" dirty="0">
                 <a:solidFill>
                   <a:srgbClr val="202122"/>
                 </a:solidFill>
@@ -547,7 +547,7 @@
               <a:t> de modelos de clima acoplados  </a:t>
             </a:r>
             <a:r>
-              <a:rPr lang="es-ES" b="0" i="0">
+              <a:rPr lang="es-ES" b="0" i="0" dirty="0">
                 <a:solidFill>
                   <a:srgbClr val="202122"/>
                 </a:solidFill>
@@ -556,7 +556,7 @@
               </a:rPr>
               <a:t> sexto informe del IPCC es 2020</a:t>
             </a:r>
-            <a:endParaRPr lang="en-GB"/>
+            <a:endParaRPr lang="en-GB" dirty="0"/>
           </a:p>
         </p:txBody>
       </p:sp>
@@ -4650,7 +4650,12 @@
             <p:ph idx="1"/>
           </p:nvPr>
         </p:nvSpPr>
-        <p:spPr/>
+        <p:spPr>
+          <a:xfrm>
+            <a:off x="676656" y="2011680"/>
+            <a:ext cx="6432067" cy="3766185"/>
+          </a:xfrm>
+        </p:spPr>
         <p:txBody>
           <a:bodyPr/>
           <a:lstStyle/>
@@ -4794,7 +4799,7 @@
         </p:blipFill>
         <p:spPr bwMode="auto">
           <a:xfrm>
-            <a:off x="8034434" y="3342691"/>
+            <a:off x="7660808" y="2457787"/>
             <a:ext cx="3638161" cy="1559212"/>
           </a:xfrm>
           <a:prstGeom prst="rect">
@@ -6980,12 +6985,14 @@
         </p:nvSpPr>
         <p:spPr>
           <a:xfrm>
-            <a:off x="667327" y="2534194"/>
-            <a:ext cx="5089662" cy="3605349"/>
+            <a:off x="3584699" y="2675709"/>
+            <a:ext cx="4764644" cy="2299062"/>
           </a:xfrm>
         </p:spPr>
         <p:txBody>
-          <a:bodyPr/>
+          <a:bodyPr>
+            <a:normAutofit/>
+          </a:bodyPr>
           <a:lstStyle/>
           <a:p>
             <a:pPr>
@@ -6993,7 +7000,7 @@
               <a:buChar char="•"/>
             </a:pPr>
             <a:r>
-              <a:rPr lang="en-GB" dirty="0">
+              <a:rPr lang="en-GB" sz="3200" dirty="0">
                 <a:latin typeface="Montserrat" panose="02000505000000020004" pitchFamily="2" charset="0"/>
               </a:rPr>
               <a:t> Replicable </a:t>
@@ -7005,19 +7012,19 @@
               <a:buChar char="•"/>
             </a:pPr>
             <a:r>
-              <a:rPr lang="en-GB" dirty="0">
+              <a:rPr lang="en-GB" sz="3200" dirty="0">
                 <a:latin typeface="Montserrat" panose="02000505000000020004" pitchFamily="2" charset="0"/>
               </a:rPr>
               <a:t> </a:t>
             </a:r>
             <a:r>
-              <a:rPr lang="en-GB" dirty="0" err="1">
+              <a:rPr lang="en-GB" sz="3200" dirty="0" err="1">
                 <a:latin typeface="Montserrat" panose="02000505000000020004" pitchFamily="2" charset="0"/>
               </a:rPr>
               <a:t>Escalable</a:t>
             </a:r>
             <a:r>
-              <a:rPr lang="en-GB" dirty="0">
+              <a:rPr lang="en-GB" sz="3200" dirty="0">
                 <a:latin typeface="Montserrat" panose="02000505000000020004" pitchFamily="2" charset="0"/>
               </a:rPr>
               <a:t> </a:t>
@@ -7029,19 +7036,19 @@
               <a:buChar char="•"/>
             </a:pPr>
             <a:r>
-              <a:rPr lang="en-GB" dirty="0">
+              <a:rPr lang="en-GB" sz="3200" dirty="0">
                 <a:latin typeface="Montserrat" panose="02000505000000020004" pitchFamily="2" charset="0"/>
               </a:rPr>
               <a:t> </a:t>
             </a:r>
             <a:r>
-              <a:rPr lang="en-GB" dirty="0" err="1">
+              <a:rPr lang="en-GB" sz="3200" dirty="0" err="1">
                 <a:latin typeface="Montserrat" panose="02000505000000020004" pitchFamily="2" charset="0"/>
               </a:rPr>
               <a:t>Solución</a:t>
             </a:r>
             <a:r>
-              <a:rPr lang="en-GB" dirty="0">
+              <a:rPr lang="en-GB" sz="3200" dirty="0">
                 <a:latin typeface="Montserrat" panose="02000505000000020004" pitchFamily="2" charset="0"/>
               </a:rPr>
               <a:t> global</a:t>
@@ -7052,7 +7059,7 @@
               <a:buFont typeface="Arial" panose="020B0604020202020204" pitchFamily="34" charset="0"/>
               <a:buChar char="•"/>
             </a:pPr>
-            <a:endParaRPr lang="en-GB" dirty="0">
+            <a:endParaRPr lang="en-GB" sz="3200" dirty="0">
               <a:latin typeface="Montserrat" panose="02000505000000020004" pitchFamily="2" charset="0"/>
             </a:endParaRPr>
           </a:p>

</xml_diff>